<commit_message>
[2023-02-20] RMS(v2.1)-2023-02-20 (주간보고 제한 및 pptx 출력 변경)
</commit_message>
<xml_diff>
--- a/src/main/webapp/WEB-INF/Files/요약본_sample.pptx
+++ b/src/main/webapp/WEB-INF/Files/요약본_sample.pptx
@@ -84,7 +84,7 @@
       </p:grpSpPr>
       <p:sp>
         <p:nvSpPr>
-          <p:cNvPr id="1563736122" name="Text">
+          <p:cNvPr id="1758397387" name="Text">
     </p:cNvPr>
           <p:cNvSpPr>
             <a:spLocks noGrp="1"/>
@@ -130,7 +130,7 @@
       </p:sp>
       <p:sp>
         <p:nvSpPr>
-          <p:cNvPr id="1259192548" name="Line"/>
+          <p:cNvPr id="1608908257" name="Line"/>
           <p:cNvSpPr>
             <a:spLocks noGrp="1"/>
           </p:cNvSpPr>
@@ -164,7 +164,7 @@
       </p:sp>
       <p:sp>
         <p:nvSpPr>
-          <p:cNvPr id="1152549999" name="Text">
+          <p:cNvPr id="699778789" name="Text">
     </p:cNvPr>
           <p:cNvSpPr>
             <a:spLocks noGrp="1"/>
@@ -228,7 +228,7 @@
       </p:sp>
       <p:sp>
         <p:nvSpPr>
-          <p:cNvPr id="805400429" name="Rectangle"/>
+          <p:cNvPr id="1709155658" name="Rectangle"/>
           <p:cNvSpPr>
             <a:spLocks noGrp="1"/>
           </p:cNvSpPr>
@@ -262,7 +262,7 @@
       </p:sp>
       <p:sp>
         <p:nvSpPr>
-          <p:cNvPr id="1217193023" name="Rectangle"/>
+          <p:cNvPr id="1964909409" name="Rectangle"/>
           <p:cNvSpPr>
             <a:spLocks noGrp="1"/>
           </p:cNvSpPr>
@@ -296,7 +296,7 @@
       </p:sp>
       <p:sp>
         <p:nvSpPr>
-          <p:cNvPr id="1831016234" name="Rectangle"/>
+          <p:cNvPr id="90493654" name="Rectangle"/>
           <p:cNvSpPr>
             <a:spLocks noGrp="1"/>
           </p:cNvSpPr>
@@ -330,7 +330,7 @@
       </p:sp>
       <p:sp>
         <p:nvSpPr>
-          <p:cNvPr id="1029863197" name="Text">
+          <p:cNvPr id="39960177" name="Text">
     </p:cNvPr>
           <p:cNvSpPr>
             <a:spLocks noGrp="1"/>
@@ -374,7 +374,7 @@
       </p:sp>
       <p:sp>
         <p:nvSpPr>
-          <p:cNvPr id="111353307" name="Text">
+          <p:cNvPr id="437038722" name="Text">
     </p:cNvPr>
           <p:cNvSpPr>
             <a:spLocks noGrp="1"/>
@@ -419,7 +419,7 @@
                 <a:ea typeface="맑은 고딕"/>
                 <a:cs typeface="맑은 고딕"/>
               </a:rPr>
-              <a:t>02/06</a:t>
+              <a:t>02/13</a:t>
             </a:r>
             <a:br/>
             <a:r>
@@ -428,14 +428,14 @@
                 <a:ea typeface="맑은 고딕"/>
                 <a:cs typeface="맑은 고딕"/>
               </a:rPr>
-              <a:t>02/06</a:t>
-            </a:r>
-          </a:p>
-        </p:txBody>
-      </p:sp>
-      <p:sp>
-        <p:nvSpPr>
-          <p:cNvPr id="698461228" name="Text">
+              <a:t>02/13</a:t>
+            </a:r>
+          </a:p>
+        </p:txBody>
+      </p:sp>
+      <p:sp>
+        <p:nvSpPr>
+          <p:cNvPr id="512590729" name="Text">
     </p:cNvPr>
           <p:cNvSpPr>
             <a:spLocks noGrp="1"/>
@@ -480,7 +480,7 @@
                 <a:ea typeface="맑은 고딕"/>
                 <a:cs typeface="맑은 고딕"/>
               </a:rPr>
-              <a:t> [BC] [BC] SAP 시스템 정기 모니터링</a:t>
+              <a:t>[BC] SAP 시스템 정기 모니터링</a:t>
             </a:r>
             <a:br/>
             <a:r>
@@ -489,14 +489,14 @@
                 <a:ea typeface="맑은 고딕"/>
                 <a:cs typeface="맑은 고딕"/>
               </a:rPr>
-              <a:t> [BC] [BC] SAP 시스템 이관 / 변경</a:t>
-            </a:r>
-          </a:p>
-        </p:txBody>
-      </p:sp>
-      <p:sp>
-        <p:nvSpPr>
-          <p:cNvPr id="1548641397" name="Text">
+              <a:t>[BC] SAP 시스템 이관 / 변경</a:t>
+            </a:r>
+          </a:p>
+        </p:txBody>
+      </p:sp>
+      <p:sp>
+        <p:nvSpPr>
+          <p:cNvPr id="1029439724" name="Text">
     </p:cNvPr>
           <p:cNvSpPr>
             <a:spLocks noGrp="1"/>
@@ -548,7 +548,7 @@
       </p:sp>
       <p:sp>
         <p:nvSpPr>
-          <p:cNvPr id="1916418686" name="Text">
+          <p:cNvPr id="843166464" name="Text">
     </p:cNvPr>
           <p:cNvSpPr>
             <a:spLocks noGrp="1"/>
@@ -600,7 +600,7 @@
       </p:sp>
       <p:sp>
         <p:nvSpPr>
-          <p:cNvPr id="1818868775" name="Text">
+          <p:cNvPr id="1296462708" name="Text">
     </p:cNvPr>
           <p:cNvSpPr>
             <a:spLocks noGrp="1"/>
@@ -645,7 +645,7 @@
                 <a:ea typeface="맑은 고딕"/>
                 <a:cs typeface="맑은 고딕"/>
               </a:rPr>
-              <a:t> [BC] [BC] SAP 시스템 정기 모니터링</a:t>
+              <a:t>[BC] SAP 시스템 정기 모니터링</a:t>
             </a:r>
             <a:br/>
             <a:r>
@@ -654,14 +654,32 @@
                 <a:ea typeface="맑은 고딕"/>
                 <a:cs typeface="맑은 고딕"/>
               </a:rPr>
-              <a:t> [BC] [BC] SAP 시스템 이관 / 변경</a:t>
-            </a:r>
-          </a:p>
-        </p:txBody>
-      </p:sp>
-      <p:sp>
-        <p:nvSpPr>
-          <p:cNvPr id="1208859978" name="Text">
+              <a:t>[BC] SAP 시스템 이관 / 변경</a:t>
+            </a:r>
+            <a:br/>
+            <a:r>
+              <a:rPr lang="ko" sz="900">
+                <a:latin typeface="맑은 고딕"/>
+                <a:ea typeface="맑은 고딕"/>
+                <a:cs typeface="맑은 고딕"/>
+              </a:rPr>
+              <a:t>[BC] (구)조회용 ERP시스템 DB 아카이브 </a:t>
+            </a:r>
+            <a:br/>
+            <a:r>
+              <a:rPr lang="ko" sz="900">
+                <a:latin typeface="맑은 고딕"/>
+                <a:ea typeface="맑은 고딕"/>
+                <a:cs typeface="맑은 고딕"/>
+              </a:rPr>
+              <a:t>로그 삭제 작업(‘22.04월~’22.11월)</a:t>
+            </a:r>
+          </a:p>
+        </p:txBody>
+      </p:sp>
+      <p:sp>
+        <p:nvSpPr>
+          <p:cNvPr id="1059397790" name="Text">
     </p:cNvPr>
           <p:cNvSpPr>
             <a:spLocks noGrp="1"/>
@@ -705,7 +723,7 @@
       </p:sp>
       <p:sp>
         <p:nvSpPr>
-          <p:cNvPr id="1741620722" name="Text">
+          <p:cNvPr id="1646464246" name="Text">
     </p:cNvPr>
           <p:cNvSpPr>
             <a:spLocks noGrp="1"/>
@@ -750,14 +768,14 @@
                 <a:ea typeface="맑은 고딕"/>
                 <a:cs typeface="맑은 고딕"/>
               </a:rPr>
-              <a:t>완료</a:t>
-            </a:r>
-          </a:p>
-        </p:txBody>
-      </p:sp>
-      <p:sp>
-        <p:nvSpPr>
-          <p:cNvPr id="1149577919" name="Text">
+              <a:t>진행중</a:t>
+            </a:r>
+          </a:p>
+        </p:txBody>
+      </p:sp>
+      <p:sp>
+        <p:nvSpPr>
+          <p:cNvPr id="1573222913" name="Text">
     </p:cNvPr>
           <p:cNvSpPr>
             <a:spLocks noGrp="1"/>
@@ -806,7 +824,7 @@
       </p:sp>
       <p:sp>
         <p:nvSpPr>
-          <p:cNvPr id="1697398412" name="Text">
+          <p:cNvPr id="593915678" name="Text">
     </p:cNvPr>
           <p:cNvSpPr>
             <a:spLocks noGrp="1"/>
@@ -855,7 +873,7 @@
       </p:sp>
       <p:sp>
         <p:nvSpPr>
-          <p:cNvPr id="1080961166" name="Text">
+          <p:cNvPr id="902924860" name="Text">
     </p:cNvPr>
           <p:cNvSpPr>
             <a:spLocks noGrp="1"/>
@@ -910,7 +928,7 @@
       </p:sp>
       <p:sp>
         <p:nvSpPr>
-          <p:cNvPr id="1603360228" name="Text">
+          <p:cNvPr id="1332704460" name="Text">
     </p:cNvPr>
           <p:cNvSpPr>
             <a:spLocks noGrp="1"/>
@@ -965,7 +983,7 @@
       </p:sp>
       <p:sp>
         <p:nvSpPr>
-          <p:cNvPr id="850156667" name="Text">
+          <p:cNvPr id="965478994" name="Text">
     </p:cNvPr>
           <p:cNvSpPr>
             <a:spLocks noGrp="1"/>
@@ -1020,7 +1038,7 @@
       </p:sp>
       <p:sp>
         <p:nvSpPr>
-          <p:cNvPr id="921750780" name="Text">
+          <p:cNvPr id="688032994" name="Text">
     </p:cNvPr>
           <p:cNvSpPr>
             <a:spLocks noGrp="1"/>
@@ -1084,7 +1102,7 @@
       </p:sp>
       <p:sp>
         <p:nvSpPr>
-          <p:cNvPr id="132888820" name="Text">
+          <p:cNvPr id="272331668" name="Text">
     </p:cNvPr>
           <p:cNvSpPr>
             <a:spLocks noGrp="1"/>
@@ -1139,7 +1157,7 @@
       </p:sp>
       <p:sp>
         <p:nvSpPr>
-          <p:cNvPr id="1375794072" name="Text">
+          <p:cNvPr id="608611403" name="Text">
     </p:cNvPr>
           <p:cNvSpPr>
             <a:spLocks noGrp="1"/>
@@ -1194,7 +1212,7 @@
       </p:sp>
       <p:sp>
         <p:nvSpPr>
-          <p:cNvPr id="43983399" name="Text">
+          <p:cNvPr id="2109864971" name="Text">
     </p:cNvPr>
           <p:cNvSpPr>
             <a:spLocks noGrp="1"/>
@@ -1249,7 +1267,7 @@
       </p:sp>
       <p:sp>
         <p:nvSpPr>
-          <p:cNvPr id="850958756" name="Text">
+          <p:cNvPr id="1075387085" name="Text">
     </p:cNvPr>
           <p:cNvSpPr>
             <a:spLocks noGrp="1"/>
@@ -1304,7 +1322,7 @@
       </p:sp>
       <p:sp>
         <p:nvSpPr>
-          <p:cNvPr id="1758378783" name="Text">
+          <p:cNvPr id="192243337" name="Text">
     </p:cNvPr>
           <p:cNvSpPr>
             <a:spLocks noGrp="1"/>
@@ -1359,7 +1377,7 @@
       </p:sp>
       <p:sp>
         <p:nvSpPr>
-          <p:cNvPr id="1032260013" name="Text">
+          <p:cNvPr id="448833368" name="Text">
     </p:cNvPr>
           <p:cNvSpPr>
             <a:spLocks noGrp="1"/>
@@ -1414,7 +1432,7 @@
       </p:sp>
       <p:sp>
         <p:nvSpPr>
-          <p:cNvPr id="1190304288" name="Text">
+          <p:cNvPr id="1746084271" name="Text">
     </p:cNvPr>
           <p:cNvSpPr>
             <a:spLocks noGrp="1"/>
@@ -1459,7 +1477,7 @@
                 <a:ea typeface="맑은 고딕"/>
                 <a:cs typeface="맑은 고딕"/>
               </a:rPr>
-              <a:t>01/30</a:t>
+              <a:t>02/06</a:t>
             </a:r>
             <a:br/>
             <a:r>
@@ -1468,14 +1486,23 @@
                 <a:ea typeface="맑은 고딕"/>
                 <a:cs typeface="맑은 고딕"/>
               </a:rPr>
-              <a:t>01/30</a:t>
-            </a:r>
-          </a:p>
-        </p:txBody>
-      </p:sp>
-      <p:sp>
-        <p:nvSpPr>
-          <p:cNvPr id="821120739" name="Text">
+              <a:t>02/06</a:t>
+            </a:r>
+            <a:br/>
+            <a:r>
+              <a:rPr lang="ko" sz="900">
+                <a:latin typeface="맑은 고딕"/>
+                <a:ea typeface="맑은 고딕"/>
+                <a:cs typeface="맑은 고딕"/>
+              </a:rPr>
+              <a:t>02/07</a:t>
+            </a:r>
+          </a:p>
+        </p:txBody>
+      </p:sp>
+      <p:sp>
+        <p:nvSpPr>
+          <p:cNvPr id="1616150802" name="Text">
     </p:cNvPr>
           <p:cNvSpPr>
             <a:spLocks noGrp="1"/>
@@ -1527,7 +1554,7 @@
       </p:sp>
       <p:sp>
         <p:nvSpPr>
-          <p:cNvPr id="762973601" name="Text">
+          <p:cNvPr id="1077273279" name="Text">
     </p:cNvPr>
           <p:cNvSpPr>
             <a:spLocks noGrp="1"/>
@@ -1537,7 +1564,7 @@
         <p:spPr>
           <a:xfrm rot="0">
             <a:off x="1181100" y="2260600"/>
-            <a:ext cx="4572000" cy="812800"/>
+            <a:ext cx="4572000" cy="1054100"/>
           </a:xfrm>
           <a:prstGeom prst="rect">
             <a:avLst/>
@@ -1572,7 +1599,7 @@
                 <a:ea typeface="맑은 고딕"/>
                 <a:cs typeface="맑은 고딕"/>
               </a:rPr>
-              <a:t> [e-Pro] 데이터 변경 업무</a:t>
+              <a:t>[e-Pro] 견적서 관련 OZ report 문제</a:t>
             </a:r>
             <a:br/>
             <a:r>
@@ -1581,14 +1608,59 @@
                 <a:ea typeface="맑은 고딕"/>
                 <a:cs typeface="맑은 고딕"/>
               </a:rPr>
-              <a:t> [e-Pro] 고도화 프로젝트 전환 작업</a:t>
-            </a:r>
-          </a:p>
-        </p:txBody>
-      </p:sp>
-      <p:sp>
-        <p:nvSpPr>
-          <p:cNvPr id="682992578" name="Text">
+              <a:t>(with 엠로 프로젝트팀)</a:t>
+            </a:r>
+            <a:br/>
+            <a:r>
+              <a:rPr lang="ko" sz="900">
+                <a:latin typeface="맑은 고딕"/>
+                <a:ea typeface="맑은 고딕"/>
+                <a:cs typeface="맑은 고딕"/>
+              </a:rPr>
+              <a:t>[e-Pro] 자체구매 로그인 오류</a:t>
+            </a:r>
+            <a:br/>
+            <a:r>
+              <a:rPr lang="ko" sz="900">
+                <a:latin typeface="맑은 고딕"/>
+                <a:ea typeface="맑은 고딕"/>
+                <a:cs typeface="맑은 고딕"/>
+              </a:rPr>
+              <a:t>(with 엠로 프로젝트팀)</a:t>
+            </a:r>
+            <a:br/>
+            <a:r>
+              <a:rPr lang="ko" sz="900">
+                <a:latin typeface="맑은 고딕"/>
+                <a:ea typeface="맑은 고딕"/>
+                <a:cs typeface="맑은 고딕"/>
+              </a:rPr>
+              <a:t>[RMS] 1차 테스트</a:t>
+            </a:r>
+            <a:br/>
+            <a:r>
+              <a:rPr lang="ko" sz="900">
+                <a:latin typeface="맑은 고딕"/>
+                <a:ea typeface="맑은 고딕"/>
+                <a:cs typeface="맑은 고딕"/>
+              </a:rPr>
+              <a:t>    (피드백 수렴 / 에러 처리)</a:t>
+            </a:r>
+            <a:br/>
+            <a:r>
+              <a:rPr lang="ko" sz="900">
+                <a:latin typeface="맑은 고딕"/>
+                <a:ea typeface="맑은 고딕"/>
+                <a:cs typeface="맑은 고딕"/>
+              </a:rPr>
+              <a:t>    1. 기능 안정화, 2. 계승 기능 추가</a:t>
+            </a:r>
+          </a:p>
+        </p:txBody>
+      </p:sp>
+      <p:sp>
+        <p:nvSpPr>
+          <p:cNvPr id="1607497606" name="Text">
     </p:cNvPr>
           <p:cNvSpPr>
             <a:spLocks noGrp="1"/>
@@ -1632,7 +1704,7 @@
       </p:sp>
       <p:sp>
         <p:nvSpPr>
-          <p:cNvPr id="2059673454" name="Text">
+          <p:cNvPr id="784284554" name="Text">
     </p:cNvPr>
           <p:cNvSpPr>
             <a:spLocks noGrp="1"/>
@@ -1684,7 +1756,7 @@
       </p:sp>
       <p:sp>
         <p:nvSpPr>
-          <p:cNvPr id="1081655427" name="Text">
+          <p:cNvPr id="1780970334" name="Text">
     </p:cNvPr>
           <p:cNvSpPr>
             <a:spLocks noGrp="1"/>
@@ -1729,23 +1801,34 @@
                 <a:ea typeface="맑은 고딕"/>
                 <a:cs typeface="맑은 고딕"/>
               </a:rPr>
-              <a:t>01/27</a:t>
+              <a:t>02/09</a:t>
             </a:r>
             <a:br/>
+            <a:br/>
             <a:r>
               <a:rPr lang="ko" sz="900">
                 <a:latin typeface="맑은 고딕"/>
                 <a:ea typeface="맑은 고딕"/>
                 <a:cs typeface="맑은 고딕"/>
               </a:rPr>
-              <a:t>01/29</a:t>
-            </a:r>
-          </a:p>
-        </p:txBody>
-      </p:sp>
-      <p:sp>
-        <p:nvSpPr>
-          <p:cNvPr id="1033034280" name="Text">
+              <a:t>02/08</a:t>
+            </a:r>
+            <a:br/>
+            <a:br/>
+            <a:r>
+              <a:rPr lang="ko" sz="900">
+                <a:latin typeface="맑은 고딕"/>
+                <a:ea typeface="맑은 고딕"/>
+                <a:cs typeface="맑은 고딕"/>
+              </a:rPr>
+              <a:t>02/06</a:t>
+            </a:r>
+          </a:p>
+        </p:txBody>
+      </p:sp>
+      <p:sp>
+        <p:nvSpPr>
+          <p:cNvPr id="99112127" name="Text">
     </p:cNvPr>
           <p:cNvSpPr>
             <a:spLocks noGrp="1"/>
@@ -1789,7 +1872,7 @@
       </p:sp>
       <p:sp>
         <p:nvSpPr>
-          <p:cNvPr id="951899627" name="Text">
+          <p:cNvPr id="1498972099" name="Text">
     </p:cNvPr>
           <p:cNvSpPr>
             <a:spLocks noGrp="1"/>
@@ -1834,23 +1917,24 @@
                 <a:ea typeface="맑은 고딕"/>
                 <a:cs typeface="맑은 고딕"/>
               </a:rPr>
-              <a:t>03/31</a:t>
+              <a:t>02/07</a:t>
             </a:r>
             <a:br/>
+            <a:br/>
             <a:r>
               <a:rPr lang="ko" sz="900">
                 <a:latin typeface="맑은 고딕"/>
                 <a:ea typeface="맑은 고딕"/>
                 <a:cs typeface="맑은 고딕"/>
               </a:rPr>
-              <a:t>[보류]</a:t>
-            </a:r>
-          </a:p>
-        </p:txBody>
-      </p:sp>
-      <p:sp>
-        <p:nvSpPr>
-          <p:cNvPr id="1658422013" name="Text">
+              <a:t>02/17</a:t>
+            </a:r>
+          </a:p>
+        </p:txBody>
+      </p:sp>
+      <p:sp>
+        <p:nvSpPr>
+          <p:cNvPr id="250375177" name="Text">
     </p:cNvPr>
           <p:cNvSpPr>
             <a:spLocks noGrp="1"/>
@@ -1895,7 +1979,7 @@
                 <a:ea typeface="맑은 고딕"/>
                 <a:cs typeface="맑은 고딕"/>
               </a:rPr>
-              <a:t>  [e-Pro] 고도화 프로젝트 관련 업무</a:t>
+              <a:t>[RMS] 피드백)시스템 기능 추가 및 보완</a:t>
             </a:r>
             <a:br/>
             <a:r>
@@ -1904,14 +1988,23 @@
                 <a:ea typeface="맑은 고딕"/>
                 <a:cs typeface="맑은 고딕"/>
               </a:rPr>
-              <a:t> [e-Pro] RODA 개정에 따른 입찰/구매품의서 자동결재선 수정</a:t>
-            </a:r>
-          </a:p>
-        </p:txBody>
-      </p:sp>
-      <p:sp>
-        <p:nvSpPr>
-          <p:cNvPr id="1680026365" name="Text">
+              <a:t>     3. 조회 및 작성(데이터 개별화)</a:t>
+            </a:r>
+            <a:br/>
+            <a:r>
+              <a:rPr lang="ko" sz="900">
+                <a:latin typeface="맑은 고딕"/>
+                <a:ea typeface="맑은 고딕"/>
+                <a:cs typeface="맑은 고딕"/>
+              </a:rPr>
+              <a:t>[RMS] 기능 문의 및 피드백 처리</a:t>
+            </a:r>
+          </a:p>
+        </p:txBody>
+      </p:sp>
+      <p:sp>
+        <p:nvSpPr>
+          <p:cNvPr id="1602245385" name="Text">
     </p:cNvPr>
           <p:cNvSpPr>
             <a:spLocks noGrp="1"/>
@@ -1963,7 +2056,7 @@
       </p:sp>
       <p:sp>
         <p:nvSpPr>
-          <p:cNvPr id="1330376651" name="Rectangle"/>
+          <p:cNvPr id="411740650" name="Rectangle"/>
           <p:cNvSpPr>
             <a:spLocks noGrp="1"/>
           </p:cNvSpPr>
@@ -1978,7 +2071,7 @@
             <a:avLst/>
           </a:prstGeom>
           <a:solidFill>
-            <a:srgbClr val="00FF00"/>
+            <a:srgbClr val="FFFF00"/>
           </a:solidFill>
           <a:ln w="12700">
             <a:solidFill>
@@ -1997,7 +2090,7 @@
       </p:sp>
       <p:sp>
         <p:nvSpPr>
-          <p:cNvPr id="294021188" name="Rectangle"/>
+          <p:cNvPr id="37124959" name="Rectangle"/>
           <p:cNvSpPr>
             <a:spLocks noGrp="1"/>
           </p:cNvSpPr>
@@ -2031,7 +2124,7 @@
       </p:sp>
       <p:sp>
         <p:nvSpPr>
-          <p:cNvPr id="1072090851" name="Text">
+          <p:cNvPr id="1876411188" name="Text">
     </p:cNvPr>
           <p:cNvSpPr>
             <a:spLocks noGrp="1"/>
@@ -2080,7 +2173,7 @@
       </p:sp>
       <p:sp>
         <p:nvSpPr>
-          <p:cNvPr id="1114599200" name="Text">
+          <p:cNvPr id="840097244" name="Text">
     </p:cNvPr>
           <p:cNvSpPr>
             <a:spLocks noGrp="1"/>
@@ -2132,7 +2225,7 @@
       </p:sp>
       <p:sp>
         <p:nvSpPr>
-          <p:cNvPr id="1389028625" name="Text">
+          <p:cNvPr id="2132469645" name="Text">
     </p:cNvPr>
           <p:cNvSpPr>
             <a:spLocks noGrp="1"/>
@@ -2184,7 +2277,7 @@
       </p:sp>
       <p:sp>
         <p:nvSpPr>
-          <p:cNvPr id="1881961284" name="Text">
+          <p:cNvPr id="1321703346" name="Text">
     </p:cNvPr>
           <p:cNvSpPr>
             <a:spLocks noGrp="1"/>
@@ -2236,7 +2329,7 @@
       </p:sp>
       <p:sp>
         <p:nvSpPr>
-          <p:cNvPr id="2033461876" name="Text">
+          <p:cNvPr id="525869885" name="Text">
     </p:cNvPr>
           <p:cNvSpPr>
             <a:spLocks noGrp="1"/>
@@ -2291,7 +2384,7 @@
       </p:sp>
       <p:sp>
         <p:nvSpPr>
-          <p:cNvPr id="1075534877" name="Text">
+          <p:cNvPr id="989917495" name="Text">
     </p:cNvPr>
           <p:cNvSpPr>
             <a:spLocks noGrp="1"/>
@@ -2346,7 +2439,7 @@
       </p:sp>
       <p:sp>
         <p:nvSpPr>
-          <p:cNvPr id="1165810530" name="Text">
+          <p:cNvPr id="319709013" name="Text">
     </p:cNvPr>
           <p:cNvSpPr>
             <a:spLocks noGrp="1"/>
@@ -2401,7 +2494,7 @@
       </p:sp>
       <p:sp>
         <p:nvSpPr>
-          <p:cNvPr id="1448683226" name="Text">
+          <p:cNvPr id="1636180097" name="Text">
     </p:cNvPr>
           <p:cNvSpPr>
             <a:spLocks noGrp="1"/>
@@ -2453,7 +2546,7 @@
       </p:sp>
       <p:sp>
         <p:nvSpPr>
-          <p:cNvPr id="250003951" name="Text">
+          <p:cNvPr id="1067038279" name="Text">
     </p:cNvPr>
           <p:cNvSpPr>
             <a:spLocks noGrp="1"/>
@@ -2505,7 +2598,7 @@
       </p:sp>
       <p:sp>
         <p:nvSpPr>
-          <p:cNvPr id="344432538" name="Text">
+          <p:cNvPr id="53240266" name="Text">
     </p:cNvPr>
           <p:cNvSpPr>
             <a:spLocks noGrp="1"/>
@@ -2557,7 +2650,7 @@
       </p:sp>
       <p:sp>
         <p:nvSpPr>
-          <p:cNvPr id="923005347" name="Text">
+          <p:cNvPr id="1656320525" name="Text">
     </p:cNvPr>
           <p:cNvSpPr>
             <a:spLocks noGrp="1"/>
@@ -2609,7 +2702,7 @@
       </p:sp>
       <p:sp>
         <p:nvSpPr>
-          <p:cNvPr id="687042159" name="Text">
+          <p:cNvPr id="854312179" name="Text">
     </p:cNvPr>
           <p:cNvSpPr>
             <a:spLocks noGrp="1"/>
@@ -2661,7 +2754,7 @@
       </p:sp>
       <p:sp>
         <p:nvSpPr>
-          <p:cNvPr id="279063335" name="Text">
+          <p:cNvPr id="1085433703" name="Text">
     </p:cNvPr>
           <p:cNvSpPr>
             <a:spLocks noGrp="1"/>
@@ -2716,7 +2809,7 @@
       </p:sp>
       <p:sp>
         <p:nvSpPr>
-          <p:cNvPr id="955325926" name="Text">
+          <p:cNvPr id="544242826" name="Text">
     </p:cNvPr>
           <p:cNvSpPr>
             <a:spLocks noGrp="1"/>
@@ -2768,7 +2861,7 @@
       </p:sp>
       <p:sp>
         <p:nvSpPr>
-          <p:cNvPr id="274169266" name="Text">
+          <p:cNvPr id="158358419" name="Text">
     </p:cNvPr>
           <p:cNvSpPr>
             <a:spLocks noGrp="1"/>
@@ -2823,7 +2916,7 @@
       </p:sp>
       <p:sp>
         <p:nvSpPr>
-          <p:cNvPr id="602204609" name="Text">
+          <p:cNvPr id="1708186130" name="Text">
     </p:cNvPr>
           <p:cNvSpPr>
             <a:spLocks noGrp="1"/>
@@ -2875,7 +2968,7 @@
       </p:sp>
       <p:sp>
         <p:nvSpPr>
-          <p:cNvPr id="572392841" name="Text">
+          <p:cNvPr id="915017872" name="Text">
     </p:cNvPr>
           <p:cNvSpPr>
             <a:spLocks noGrp="1"/>
@@ -2921,7 +3014,7 @@
       </p:sp>
       <p:pic>
         <p:nvPicPr>
-          <p:cNvPr id="1877951353" name="Picture">
+          <p:cNvPr id="462494500" name="Picture">
     </p:cNvPr>
           <p:cNvPicPr>
             <a:picLocks noChangeAspect="1"/>

</xml_diff>